<commit_message>
ajustando informações da apresentação e criando novo log file
</commit_message>
<xml_diff>
--- a/docs/Early stage diabetes – risk predictions.pptx
+++ b/docs/Early stage diabetes – risk predictions.pptx
@@ -117,6 +117,11 @@
       </a:defRPr>
     </a:lvl9pPr>
   </p:defaultTextStyle>
+  <p:extLst>
+    <p:ext uri="{EFAFB233-063F-42B5-8137-9DF3F51BA10A}">
+      <p15:sldGuideLst xmlns:p15="http://schemas.microsoft.com/office/powerpoint/2012/main"/>
+    </p:ext>
+  </p:extLst>
 </p:presentation>
 </file>
 
@@ -842,7 +847,7 @@
           <a:p>
             <a:fld id="{11EAACC7-3B3F-47D1-959A-EF58926E955E}" type="datetimeFigureOut">
               <a:rPr lang="en-US" smtClean="0"/>
-              <a:t>8/17/2021</a:t>
+              <a:t>8/18/2021</a:t>
             </a:fld>
             <a:endParaRPr lang="en-US"/>
           </a:p>
@@ -1093,7 +1098,7 @@
           <a:p>
             <a:fld id="{11EAACC7-3B3F-47D1-959A-EF58926E955E}" type="datetimeFigureOut">
               <a:rPr lang="en-US" smtClean="0"/>
-              <a:t>8/17/2021</a:t>
+              <a:t>8/18/2021</a:t>
             </a:fld>
             <a:endParaRPr lang="en-US"/>
           </a:p>
@@ -1407,7 +1412,7 @@
           <a:p>
             <a:fld id="{11EAACC7-3B3F-47D1-959A-EF58926E955E}" type="datetimeFigureOut">
               <a:rPr lang="en-US" smtClean="0"/>
-              <a:t>8/17/2021</a:t>
+              <a:t>8/18/2021</a:t>
             </a:fld>
             <a:endParaRPr lang="en-US"/>
           </a:p>
@@ -1748,7 +1753,7 @@
           <a:p>
             <a:fld id="{11EAACC7-3B3F-47D1-959A-EF58926E955E}" type="datetimeFigureOut">
               <a:rPr lang="en-US" smtClean="0"/>
-              <a:t>8/17/2021</a:t>
+              <a:t>8/18/2021</a:t>
             </a:fld>
             <a:endParaRPr lang="en-US"/>
           </a:p>
@@ -2062,7 +2067,7 @@
           <a:p>
             <a:fld id="{11EAACC7-3B3F-47D1-959A-EF58926E955E}" type="datetimeFigureOut">
               <a:rPr lang="en-US" smtClean="0"/>
-              <a:t>8/17/2021</a:t>
+              <a:t>8/18/2021</a:t>
             </a:fld>
             <a:endParaRPr lang="en-US"/>
           </a:p>
@@ -2455,7 +2460,7 @@
           <a:p>
             <a:fld id="{11EAACC7-3B3F-47D1-959A-EF58926E955E}" type="datetimeFigureOut">
               <a:rPr lang="en-US" smtClean="0"/>
-              <a:t>8/17/2021</a:t>
+              <a:t>8/18/2021</a:t>
             </a:fld>
             <a:endParaRPr lang="en-US"/>
           </a:p>
@@ -2625,7 +2630,7 @@
           <a:p>
             <a:fld id="{11EAACC7-3B3F-47D1-959A-EF58926E955E}" type="datetimeFigureOut">
               <a:rPr lang="en-US" smtClean="0"/>
-              <a:t>8/17/2021</a:t>
+              <a:t>8/18/2021</a:t>
             </a:fld>
             <a:endParaRPr lang="en-US"/>
           </a:p>
@@ -2805,7 +2810,7 @@
           <a:p>
             <a:fld id="{11EAACC7-3B3F-47D1-959A-EF58926E955E}" type="datetimeFigureOut">
               <a:rPr lang="en-US" smtClean="0"/>
-              <a:t>8/17/2021</a:t>
+              <a:t>8/18/2021</a:t>
             </a:fld>
             <a:endParaRPr lang="en-US"/>
           </a:p>
@@ -2981,7 +2986,7 @@
           <a:p>
             <a:fld id="{11EAACC7-3B3F-47D1-959A-EF58926E955E}" type="datetimeFigureOut">
               <a:rPr lang="en-US" smtClean="0"/>
-              <a:t>8/17/2021</a:t>
+              <a:t>8/18/2021</a:t>
             </a:fld>
             <a:endParaRPr lang="en-US"/>
           </a:p>
@@ -3228,7 +3233,7 @@
           <a:p>
             <a:fld id="{11EAACC7-3B3F-47D1-959A-EF58926E955E}" type="datetimeFigureOut">
               <a:rPr lang="en-US" smtClean="0"/>
-              <a:t>8/17/2021</a:t>
+              <a:t>8/18/2021</a:t>
             </a:fld>
             <a:endParaRPr lang="en-US"/>
           </a:p>
@@ -3460,7 +3465,7 @@
           <a:p>
             <a:fld id="{11EAACC7-3B3F-47D1-959A-EF58926E955E}" type="datetimeFigureOut">
               <a:rPr lang="en-US" smtClean="0"/>
-              <a:t>8/17/2021</a:t>
+              <a:t>8/18/2021</a:t>
             </a:fld>
             <a:endParaRPr lang="en-US"/>
           </a:p>
@@ -3834,7 +3839,7 @@
           <a:p>
             <a:fld id="{11EAACC7-3B3F-47D1-959A-EF58926E955E}" type="datetimeFigureOut">
               <a:rPr lang="en-US" smtClean="0"/>
-              <a:t>8/17/2021</a:t>
+              <a:t>8/18/2021</a:t>
             </a:fld>
             <a:endParaRPr lang="en-US"/>
           </a:p>
@@ -3957,7 +3962,7 @@
           <a:p>
             <a:fld id="{11EAACC7-3B3F-47D1-959A-EF58926E955E}" type="datetimeFigureOut">
               <a:rPr lang="en-US" smtClean="0"/>
-              <a:t>8/17/2021</a:t>
+              <a:t>8/18/2021</a:t>
             </a:fld>
             <a:endParaRPr lang="en-US"/>
           </a:p>
@@ -4052,7 +4057,7 @@
           <a:p>
             <a:fld id="{11EAACC7-3B3F-47D1-959A-EF58926E955E}" type="datetimeFigureOut">
               <a:rPr lang="en-US" smtClean="0"/>
-              <a:t>8/17/2021</a:t>
+              <a:t>8/18/2021</a:t>
             </a:fld>
             <a:endParaRPr lang="en-US"/>
           </a:p>
@@ -4307,7 +4312,7 @@
           <a:p>
             <a:fld id="{11EAACC7-3B3F-47D1-959A-EF58926E955E}" type="datetimeFigureOut">
               <a:rPr lang="en-US" smtClean="0"/>
-              <a:t>8/17/2021</a:t>
+              <a:t>8/18/2021</a:t>
             </a:fld>
             <a:endParaRPr lang="en-US"/>
           </a:p>
@@ -4570,7 +4575,7 @@
           <a:p>
             <a:fld id="{11EAACC7-3B3F-47D1-959A-EF58926E955E}" type="datetimeFigureOut">
               <a:rPr lang="en-US" smtClean="0"/>
-              <a:t>8/17/2021</a:t>
+              <a:t>8/18/2021</a:t>
             </a:fld>
             <a:endParaRPr lang="en-US"/>
           </a:p>
@@ -5313,7 +5318,7 @@
           <a:p>
             <a:fld id="{11EAACC7-3B3F-47D1-959A-EF58926E955E}" type="datetimeFigureOut">
               <a:rPr lang="en-US" smtClean="0"/>
-              <a:t>8/17/2021</a:t>
+              <a:t>8/18/2021</a:t>
             </a:fld>
             <a:endParaRPr lang="en-US"/>
           </a:p>
@@ -6076,155 +6081,155 @@
           <a:p>
             <a:pPr algn="just"/>
             <a:r>
-              <a:rPr lang="en-US" sz="2000" dirty="0" err="1"/>
+              <a:rPr lang="en-US" dirty="0" err="1"/>
               <a:t>Após</a:t>
             </a:r>
             <a:r>
-              <a:rPr lang="en-US" sz="2000" dirty="0"/>
+              <a:rPr lang="en-US" dirty="0"/>
               <a:t> </a:t>
             </a:r>
             <a:r>
-              <a:rPr lang="en-US" sz="2000" dirty="0" err="1"/>
+              <a:rPr lang="en-US" dirty="0" err="1"/>
               <a:t>análise</a:t>
             </a:r>
             <a:r>
-              <a:rPr lang="en-US" sz="2000" dirty="0"/>
+              <a:rPr lang="en-US" dirty="0"/>
               <a:t> das </a:t>
             </a:r>
             <a:r>
-              <a:rPr lang="en-US" sz="2000" dirty="0" err="1"/>
+              <a:rPr lang="en-US" dirty="0" err="1"/>
               <a:t>variáveis</a:t>
             </a:r>
             <a:r>
-              <a:rPr lang="en-US" sz="2000" dirty="0"/>
+              <a:rPr lang="en-US" dirty="0"/>
               <a:t> </a:t>
             </a:r>
             <a:r>
-              <a:rPr lang="en-US" sz="2000" dirty="0" err="1"/>
+              <a:rPr lang="en-US" dirty="0" err="1"/>
               <a:t>foram</a:t>
             </a:r>
             <a:r>
-              <a:rPr lang="en-US" sz="2000" dirty="0"/>
+              <a:rPr lang="en-US" dirty="0"/>
               <a:t> </a:t>
             </a:r>
             <a:r>
-              <a:rPr lang="en-US" sz="2000" dirty="0" err="1"/>
+              <a:rPr lang="en-US" dirty="0" err="1"/>
               <a:t>feitas</a:t>
             </a:r>
             <a:r>
-              <a:rPr lang="en-US" sz="2000" dirty="0"/>
+              <a:rPr lang="en-US" dirty="0"/>
               <a:t> </a:t>
             </a:r>
             <a:r>
-              <a:rPr lang="en-US" sz="2000" dirty="0" err="1"/>
+              <a:rPr lang="en-US" dirty="0" err="1"/>
               <a:t>algumas</a:t>
             </a:r>
             <a:r>
-              <a:rPr lang="en-US" sz="2000" dirty="0"/>
+              <a:rPr lang="en-US" dirty="0"/>
               <a:t> </a:t>
             </a:r>
             <a:r>
-              <a:rPr lang="en-US" sz="2000" dirty="0" err="1"/>
+              <a:rPr lang="en-US" dirty="0" err="1"/>
               <a:t>considerações</a:t>
             </a:r>
             <a:r>
-              <a:rPr lang="en-US" sz="2000" dirty="0"/>
+              <a:rPr lang="en-US" dirty="0"/>
               <a:t> para </a:t>
             </a:r>
             <a:r>
-              <a:rPr lang="en-US" sz="2000" dirty="0" err="1"/>
+              <a:rPr lang="en-US" dirty="0" err="1"/>
               <a:t>seleção</a:t>
             </a:r>
             <a:r>
-              <a:rPr lang="en-US" sz="2000" dirty="0"/>
+              <a:rPr lang="en-US" dirty="0"/>
               <a:t> das </a:t>
             </a:r>
             <a:r>
-              <a:rPr lang="en-US" sz="2000" dirty="0" err="1"/>
+              <a:rPr lang="en-US" dirty="0" err="1"/>
               <a:t>mais</a:t>
             </a:r>
             <a:r>
-              <a:rPr lang="en-US" sz="2000" dirty="0"/>
+              <a:rPr lang="en-US" dirty="0"/>
               <a:t> </a:t>
             </a:r>
             <a:r>
-              <a:rPr lang="en-US" sz="2000" dirty="0" err="1"/>
+              <a:rPr lang="en-US" dirty="0" err="1"/>
               <a:t>importantes</a:t>
             </a:r>
             <a:r>
-              <a:rPr lang="en-US" sz="2000" dirty="0"/>
+              <a:rPr lang="en-US" dirty="0"/>
               <a:t>, </a:t>
             </a:r>
             <a:r>
-              <a:rPr lang="en-US" sz="2000" dirty="0" err="1"/>
+              <a:rPr lang="en-US" dirty="0" err="1"/>
               <a:t>retirando</a:t>
             </a:r>
             <a:r>
-              <a:rPr lang="en-US" sz="2000" dirty="0"/>
+              <a:rPr lang="en-US" dirty="0"/>
               <a:t> as </a:t>
             </a:r>
             <a:r>
-              <a:rPr lang="en-US" sz="2000" b="1" dirty="0"/>
+              <a:rPr lang="en-US" b="1" dirty="0"/>
               <a:t>5 que </a:t>
             </a:r>
             <a:r>
-              <a:rPr lang="en-US" sz="2000" b="1" dirty="0" err="1"/>
+              <a:rPr lang="en-US" b="1" dirty="0" err="1"/>
               <a:t>menos</a:t>
             </a:r>
             <a:r>
-              <a:rPr lang="en-US" sz="2000" b="1" dirty="0"/>
+              <a:rPr lang="en-US" b="1" dirty="0"/>
               <a:t> </a:t>
             </a:r>
             <a:r>
-              <a:rPr lang="en-US" sz="2000" b="1" dirty="0" err="1"/>
+              <a:rPr lang="en-US" b="1" dirty="0" err="1"/>
               <a:t>são</a:t>
             </a:r>
             <a:r>
-              <a:rPr lang="en-US" sz="2000" b="1" dirty="0"/>
+              <a:rPr lang="en-US" b="1" dirty="0"/>
               <a:t> </a:t>
             </a:r>
             <a:r>
-              <a:rPr lang="en-US" sz="2000" b="1" dirty="0" err="1"/>
+              <a:rPr lang="en-US" b="1" dirty="0" err="1"/>
               <a:t>importantes</a:t>
             </a:r>
             <a:r>
-              <a:rPr lang="en-US" sz="2000" b="1" dirty="0"/>
+              <a:rPr lang="en-US" b="1" dirty="0"/>
               <a:t> </a:t>
             </a:r>
             <a:r>
-              <a:rPr lang="en-US" sz="2000" b="1" dirty="0" err="1"/>
+              <a:rPr lang="en-US" b="1" dirty="0" err="1"/>
               <a:t>em</a:t>
             </a:r>
             <a:r>
-              <a:rPr lang="en-US" sz="2000" b="1" dirty="0"/>
+              <a:rPr lang="en-US" b="1" dirty="0"/>
               <a:t> </a:t>
             </a:r>
             <a:r>
-              <a:rPr lang="en-US" sz="2000" b="1" dirty="0" err="1"/>
+              <a:rPr lang="en-US" b="1" dirty="0" err="1"/>
               <a:t>relação</a:t>
             </a:r>
             <a:r>
-              <a:rPr lang="en-US" sz="2000" b="1" dirty="0"/>
+              <a:rPr lang="en-US" b="1" dirty="0"/>
               <a:t> </a:t>
             </a:r>
             <a:r>
-              <a:rPr lang="en-US" sz="2000" b="1" dirty="0" err="1"/>
+              <a:rPr lang="en-US" b="1" dirty="0" err="1"/>
               <a:t>ao</a:t>
             </a:r>
             <a:r>
-              <a:rPr lang="en-US" sz="2000" b="1" dirty="0"/>
+              <a:rPr lang="en-US" b="1" dirty="0"/>
               <a:t> </a:t>
             </a:r>
             <a:r>
-              <a:rPr lang="en-US" sz="2000" b="1" dirty="0" err="1"/>
+              <a:rPr lang="en-US" b="1" dirty="0" err="1"/>
               <a:t>diagnóstico</a:t>
             </a:r>
             <a:r>
-              <a:rPr lang="en-US" sz="2000" b="1" dirty="0"/>
+              <a:rPr lang="en-US" b="1" dirty="0"/>
               <a:t> de diabetes</a:t>
             </a:r>
             <a:r>
-              <a:rPr lang="en-US" sz="2000" dirty="0"/>
+              <a:rPr lang="en-US" dirty="0"/>
               <a:t>:</a:t>
             </a:r>
           </a:p>
@@ -6246,91 +6251,91 @@
           <a:p>
             <a:pPr algn="just"/>
             <a:r>
-              <a:rPr lang="en-US" sz="2000" dirty="0" err="1"/>
+              <a:rPr lang="en-US" dirty="0" err="1"/>
               <a:t>Além</a:t>
             </a:r>
             <a:r>
-              <a:rPr lang="en-US" sz="2000" dirty="0"/>
+              <a:rPr lang="en-US" dirty="0"/>
               <a:t> </a:t>
             </a:r>
             <a:r>
-              <a:rPr lang="en-US" sz="2000" dirty="0" err="1"/>
+              <a:rPr lang="en-US" dirty="0" err="1"/>
               <a:t>disso</a:t>
             </a:r>
             <a:r>
-              <a:rPr lang="en-US" sz="2000" dirty="0"/>
+              <a:rPr lang="en-US" dirty="0"/>
               <a:t>, </a:t>
             </a:r>
             <a:r>
-              <a:rPr lang="en-US" sz="2000" dirty="0" err="1"/>
+              <a:rPr lang="en-US" dirty="0" err="1"/>
               <a:t>os</a:t>
             </a:r>
             <a:r>
-              <a:rPr lang="en-US" sz="2000" dirty="0"/>
+              <a:rPr lang="en-US" dirty="0"/>
               <a:t> </a:t>
             </a:r>
             <a:r>
-              <a:rPr lang="en-US" sz="2000" dirty="0" err="1"/>
+              <a:rPr lang="en-US" dirty="0" err="1"/>
               <a:t>valores</a:t>
             </a:r>
             <a:r>
-              <a:rPr lang="en-US" sz="2000" dirty="0"/>
+              <a:rPr lang="en-US" dirty="0"/>
               <a:t> das </a:t>
             </a:r>
             <a:r>
-              <a:rPr lang="en-US" sz="2000" dirty="0" err="1"/>
+              <a:rPr lang="en-US" dirty="0" err="1"/>
               <a:t>variáveis</a:t>
             </a:r>
             <a:r>
-              <a:rPr lang="en-US" sz="2000" dirty="0"/>
+              <a:rPr lang="en-US" dirty="0"/>
               <a:t> </a:t>
             </a:r>
             <a:r>
-              <a:rPr lang="en-US" sz="2000" dirty="0" err="1"/>
+              <a:rPr lang="en-US" dirty="0" err="1"/>
               <a:t>foram</a:t>
             </a:r>
             <a:r>
-              <a:rPr lang="en-US" sz="2000" dirty="0"/>
+              <a:rPr lang="en-US" dirty="0"/>
               <a:t> </a:t>
             </a:r>
             <a:r>
-              <a:rPr lang="en-US" sz="2000" dirty="0" err="1"/>
+              <a:rPr lang="en-US" dirty="0" err="1"/>
               <a:t>transformadas</a:t>
             </a:r>
             <a:r>
-              <a:rPr lang="en-US" sz="2000" dirty="0"/>
+              <a:rPr lang="en-US" dirty="0"/>
               <a:t> da </a:t>
             </a:r>
             <a:r>
-              <a:rPr lang="en-US" sz="2000" dirty="0" err="1"/>
+              <a:rPr lang="en-US" dirty="0" err="1"/>
               <a:t>seguinte</a:t>
             </a:r>
             <a:r>
-              <a:rPr lang="en-US" sz="2000" dirty="0"/>
+              <a:rPr lang="en-US" dirty="0"/>
               <a:t> forma, para </a:t>
             </a:r>
             <a:r>
-              <a:rPr lang="en-US" sz="2000" dirty="0" err="1"/>
+              <a:rPr lang="en-US" dirty="0" err="1"/>
               <a:t>serem</a:t>
             </a:r>
             <a:r>
-              <a:rPr lang="en-US" sz="2000" dirty="0"/>
+              <a:rPr lang="en-US" dirty="0"/>
               <a:t> </a:t>
             </a:r>
             <a:r>
-              <a:rPr lang="en-US" sz="2000" dirty="0" err="1"/>
+              <a:rPr lang="en-US" dirty="0" err="1"/>
               <a:t>utilizadas</a:t>
             </a:r>
             <a:r>
-              <a:rPr lang="en-US" sz="2000" dirty="0"/>
+              <a:rPr lang="en-US" dirty="0"/>
               <a:t> no </a:t>
             </a:r>
             <a:r>
-              <a:rPr lang="en-US" sz="2000" dirty="0" err="1"/>
+              <a:rPr lang="en-US" dirty="0" err="1"/>
               <a:t>modelo</a:t>
             </a:r>
             <a:r>
-              <a:rPr lang="en-US" sz="2000" dirty="0"/>
+              <a:rPr lang="en-US" dirty="0"/>
               <a:t>:</a:t>
             </a:r>
           </a:p>
@@ -7004,7 +7009,7 @@
             </a:r>
             <a:r>
               <a:rPr lang="en-US" dirty="0"/>
-              <a:t> de o </a:t>
+              <a:t> se o </a:t>
             </a:r>
             <a:r>
               <a:rPr lang="en-US" dirty="0" err="1"/>
@@ -7522,7 +7527,7 @@
             </a:r>
             <a:r>
               <a:rPr lang="en-US" dirty="0"/>
-              <a:t> que é a </a:t>
+              <a:t>, que é a </a:t>
             </a:r>
             <a:r>
               <a:rPr lang="en-US" dirty="0" err="1"/>
@@ -7538,7 +7543,7 @@
             </a:r>
             <a:r>
               <a:rPr lang="en-US" dirty="0"/>
-              <a:t> dee </a:t>
+              <a:t> de </a:t>
             </a:r>
             <a:r>
               <a:rPr lang="en-US" dirty="0" err="1"/>
@@ -7546,15 +7551,7 @@
             </a:r>
             <a:r>
               <a:rPr lang="en-US" dirty="0"/>
-              <a:t> e a </a:t>
-            </a:r>
-            <a:r>
-              <a:rPr lang="en-US" dirty="0" err="1"/>
-              <a:t>polidipsia</a:t>
-            </a:r>
-            <a:r>
-              <a:rPr lang="en-US" dirty="0"/>
-              <a:t> que é a </a:t>
+              <a:t>, e a polydipsia, que é a </a:t>
             </a:r>
             <a:r>
               <a:rPr lang="en-US" dirty="0" err="1"/>
@@ -7570,7 +7567,7 @@
             </a:r>
             <a:r>
               <a:rPr lang="en-US" dirty="0"/>
-              <a:t> </a:t>
+              <a:t>, </a:t>
             </a:r>
             <a:r>
               <a:rPr lang="en-US" dirty="0" err="1"/>
@@ -8050,34 +8047,58 @@
           <a:lstStyle/>
           <a:p>
             <a:pPr algn="just"/>
+            <a:endParaRPr lang="pt-BR" b="0" i="0" dirty="0">
+              <a:effectLst/>
+            </a:endParaRPr>
+          </a:p>
+          <a:p>
+            <a:pPr algn="just"/>
             <a:r>
               <a:rPr lang="pt-BR" b="0" i="0" dirty="0">
                 <a:effectLst/>
-                <a:latin typeface="Helvetica Neue"/>
               </a:rPr>
-              <a:t>O modelo poderá encontrar dificuldades de manter seu desempenho se a proporção de homens e mulheres for muito diferente dos dados utilizados;</a:t>
-            </a:r>
-          </a:p>
-          <a:p>
-            <a:pPr algn="just"/>
+              <a:t>O modelo obteve um bom desempenho</a:t>
+            </a:r>
+            <a:r>
+              <a:rPr lang="pt-BR" dirty="0"/>
+              <a:t>. No entanto,</a:t>
+            </a:r>
             <a:r>
               <a:rPr lang="pt-BR" b="0" i="0" dirty="0">
                 <a:effectLst/>
-                <a:latin typeface="Helvetica Neue"/>
+              </a:rPr>
+              <a:t> poderá encontrar dificuldades de manter seu desempenho </a:t>
+            </a:r>
+            <a:r>
+              <a:rPr lang="pt-BR" b="1" i="0" dirty="0">
+                <a:effectLst/>
+              </a:rPr>
+              <a:t>se a proporção de homens e mulheres for muito diferente dos dados utilizados</a:t>
+            </a:r>
+            <a:r>
+              <a:rPr lang="pt-BR" b="0" i="0" dirty="0">
+                <a:effectLst/>
+              </a:rPr>
+              <a:t>;</a:t>
+            </a:r>
+          </a:p>
+          <a:p>
+            <a:pPr algn="just"/>
+            <a:r>
+              <a:rPr lang="pt-BR" b="0" i="0" dirty="0">
+                <a:effectLst/>
               </a:rPr>
               <a:t> Além disso, se a distribuição dos dados de pessoas com </a:t>
             </a:r>
             <a:r>
               <a:rPr lang="pt-BR" b="0" i="0" dirty="0" err="1">
                 <a:effectLst/>
-                <a:latin typeface="Helvetica Neue"/>
               </a:rPr>
               <a:t>Polydpsia</a:t>
             </a:r>
             <a:r>
               <a:rPr lang="pt-BR" b="0" i="0" dirty="0">
                 <a:effectLst/>
-                <a:latin typeface="Helvetica Neue"/>
               </a:rPr>
               <a:t> for alterado significante, também, poderá impactar no seu desempenho já que essa variáveis são importantes no diagnóstico;</a:t>
             </a:r>
@@ -8087,21 +8108,18 @@
             <a:r>
               <a:rPr lang="pt-BR" b="0" i="0" dirty="0">
                 <a:effectLst/>
-                <a:latin typeface="Helvetica Neue"/>
               </a:rPr>
               <a:t> Vale ressaltar, também, que o </a:t>
             </a:r>
             <a:r>
               <a:rPr lang="pt-BR" b="0" i="0" dirty="0" err="1">
                 <a:effectLst/>
-                <a:latin typeface="Helvetica Neue"/>
               </a:rPr>
               <a:t>dataset</a:t>
             </a:r>
             <a:r>
               <a:rPr lang="pt-BR" b="0" i="0" dirty="0">
                 <a:effectLst/>
-                <a:latin typeface="Helvetica Neue"/>
               </a:rPr>
               <a:t> é relativamente pequeno o que pode levar a diagnóstico incorretos conforme mais informações sejam fornecidas ao presente modelo</a:t>
             </a:r>
@@ -9494,14 +9512,14 @@
             </a:r>
             <a:r>
               <a:rPr lang="pt-BR" dirty="0"/>
-              <a:t> contém 520 registros para serem trabalhadas com 17 colunas. Nenhum dos registros está com campos vazios;</a:t>
+              <a:t> contém 520 registros com 17 colunas. Nenhum dos registros está com campos vazios;</a:t>
             </a:r>
           </a:p>
           <a:p>
             <a:pPr algn="just"/>
             <a:r>
               <a:rPr lang="pt-BR" dirty="0"/>
-              <a:t>Dessas 17 colunas, 16 contém variáveis binárias e uma contínua que é a idade do paciente (“Age”);</a:t>
+              <a:t>Dessas 17 colunas, 16 são variáveis binárias e uma contínua que é a idade do paciente (“Age”);</a:t>
             </a:r>
           </a:p>
           <a:p>
@@ -9912,15 +9930,7 @@
             <a:pPr algn="just"/>
             <a:r>
               <a:rPr lang="pt-BR" dirty="0"/>
-              <a:t>Observa-se uma maior proporção de pessoas não obesas com diagnóstico </a:t>
-            </a:r>
-            <a:r>
-              <a:rPr lang="pt-BR" dirty="0" err="1"/>
-              <a:t>postivo</a:t>
-            </a:r>
-            <a:r>
-              <a:rPr lang="pt-BR" dirty="0"/>
-              <a:t> para diabetes, embora, saibamos que a proporção de pessoas não obesas no geral é maior. </a:t>
+              <a:t>Observa-se uma maior proporção de pessoas não obesas com diagnóstico positivo para diabetes, embora, saibamos que a proporção de pessoas não obesas no geral é maior. </a:t>
             </a:r>
           </a:p>
           <a:p>
@@ -10138,6 +10148,7 @@
           </a:bodyPr>
           <a:lstStyle/>
           <a:p>
+            <a:pPr algn="just"/>
             <a:r>
               <a:rPr lang="pt-BR" dirty="0"/>
               <a:t>Embora o número de homens no </a:t>
@@ -10300,7 +10311,7 @@
         <p:spPr>
           <a:xfrm>
             <a:off x="203998" y="1389287"/>
-            <a:ext cx="10153660" cy="4694062"/>
+            <a:ext cx="9172758" cy="4694062"/>
           </a:xfrm>
         </p:spPr>
         <p:txBody>
@@ -10309,6 +10320,7 @@
           </a:bodyPr>
           <a:lstStyle/>
           <a:p>
+            <a:pPr algn="just"/>
             <a:r>
               <a:rPr lang="pt-BR" dirty="0"/>
               <a:t>Avaliando todas as variáveis quanto a proporção de casos positivos podemos constatar que as variáveis que a “</a:t>
@@ -10339,23 +10351,24 @@
             </a:r>
           </a:p>
           <a:p>
-            <a:pPr marL="0" indent="0">
+            <a:pPr marL="0" indent="0" algn="just">
               <a:buNone/>
             </a:pPr>
             <a:endParaRPr lang="pt-BR" dirty="0"/>
           </a:p>
           <a:p>
+            <a:pPr algn="just"/>
             <a:r>
               <a:rPr lang="pt-BR" dirty="0"/>
               <a:t>Os casos de alopecia são os que estão menos relacionados ao </a:t>
             </a:r>
             <a:r>
               <a:rPr lang="pt-BR" dirty="0" err="1"/>
-              <a:t>diganóstico</a:t>
+              <a:t>digagnóstico</a:t>
             </a:r>
             <a:r>
               <a:rPr lang="pt-BR" dirty="0"/>
-              <a:t> positivo de diabetes. Resultado similar pode ser identificado na correlação dessas variáveis</a:t>
+              <a:t> positivo de diabetes. Resultado similar foi identificado na correlação dessas variáveis</a:t>
             </a:r>
           </a:p>
         </p:txBody>
@@ -10389,7 +10402,7 @@
         </p:blipFill>
         <p:spPr bwMode="auto">
           <a:xfrm>
-            <a:off x="1099128" y="3368965"/>
+            <a:off x="1198881" y="3429000"/>
             <a:ext cx="6742544" cy="3336175"/>
           </a:xfrm>
           <a:prstGeom prst="rect">

</xml_diff>